<commit_message>
PPT of mobile predication project
</commit_message>
<xml_diff>
--- a/Price Prediction for Mobile Phones.pptx
+++ b/Price Prediction for Mobile Phones.pptx
@@ -23,8 +23,8 @@
     <p:sldId id="271" r:id="rId17"/>
     <p:sldId id="272" r:id="rId18"/>
     <p:sldId id="273" r:id="rId19"/>
-    <p:sldId id="274" r:id="rId20"/>
-    <p:sldId id="275" r:id="rId21"/>
+    <p:sldId id="275" r:id="rId20"/>
+    <p:sldId id="274" r:id="rId21"/>
   </p:sldIdLst>
   <p:sldSz cx="9144000" cy="6858000" type="screen4x3"/>
   <p:notesSz cx="6858000" cy="9144000"/>
@@ -299,7 +299,7 @@
           <a:p>
             <a:fld id="{214A6ADF-3E22-42CC-8AF9-71CE0A99CC1E}" type="datetimeFigureOut">
               <a:rPr lang="en-GB" smtClean="0"/>
-              <a:t>07/04/2024</a:t>
+              <a:t>08/04/2024</a:t>
             </a:fld>
             <a:endParaRPr lang="en-GB"/>
           </a:p>
@@ -464,7 +464,7 @@
           <a:p>
             <a:fld id="{214A6ADF-3E22-42CC-8AF9-71CE0A99CC1E}" type="datetimeFigureOut">
               <a:rPr lang="en-GB" smtClean="0"/>
-              <a:t>07/04/2024</a:t>
+              <a:t>08/04/2024</a:t>
             </a:fld>
             <a:endParaRPr lang="en-GB"/>
           </a:p>
@@ -639,7 +639,7 @@
           <a:p>
             <a:fld id="{214A6ADF-3E22-42CC-8AF9-71CE0A99CC1E}" type="datetimeFigureOut">
               <a:rPr lang="en-GB" smtClean="0"/>
-              <a:t>07/04/2024</a:t>
+              <a:t>08/04/2024</a:t>
             </a:fld>
             <a:endParaRPr lang="en-GB"/>
           </a:p>
@@ -804,7 +804,7 @@
           <a:p>
             <a:fld id="{214A6ADF-3E22-42CC-8AF9-71CE0A99CC1E}" type="datetimeFigureOut">
               <a:rPr lang="en-GB" smtClean="0"/>
-              <a:t>07/04/2024</a:t>
+              <a:t>08/04/2024</a:t>
             </a:fld>
             <a:endParaRPr lang="en-GB"/>
           </a:p>
@@ -1046,7 +1046,7 @@
           <a:p>
             <a:fld id="{214A6ADF-3E22-42CC-8AF9-71CE0A99CC1E}" type="datetimeFigureOut">
               <a:rPr lang="en-GB" smtClean="0"/>
-              <a:t>07/04/2024</a:t>
+              <a:t>08/04/2024</a:t>
             </a:fld>
             <a:endParaRPr lang="en-GB"/>
           </a:p>
@@ -1310,7 +1310,7 @@
           <a:p>
             <a:fld id="{214A6ADF-3E22-42CC-8AF9-71CE0A99CC1E}" type="datetimeFigureOut">
               <a:rPr lang="en-GB" smtClean="0"/>
-              <a:t>07/04/2024</a:t>
+              <a:t>08/04/2024</a:t>
             </a:fld>
             <a:endParaRPr lang="en-GB"/>
           </a:p>
@@ -1688,7 +1688,7 @@
           <a:p>
             <a:fld id="{214A6ADF-3E22-42CC-8AF9-71CE0A99CC1E}" type="datetimeFigureOut">
               <a:rPr lang="en-GB" smtClean="0"/>
-              <a:t>07/04/2024</a:t>
+              <a:t>08/04/2024</a:t>
             </a:fld>
             <a:endParaRPr lang="en-GB"/>
           </a:p>
@@ -1838,7 +1838,7 @@
           <a:p>
             <a:fld id="{214A6ADF-3E22-42CC-8AF9-71CE0A99CC1E}" type="datetimeFigureOut">
               <a:rPr lang="en-GB" smtClean="0"/>
-              <a:t>07/04/2024</a:t>
+              <a:t>08/04/2024</a:t>
             </a:fld>
             <a:endParaRPr lang="en-GB"/>
           </a:p>
@@ -1928,7 +1928,7 @@
           <a:p>
             <a:fld id="{214A6ADF-3E22-42CC-8AF9-71CE0A99CC1E}" type="datetimeFigureOut">
               <a:rPr lang="en-GB" smtClean="0"/>
-              <a:t>07/04/2024</a:t>
+              <a:t>08/04/2024</a:t>
             </a:fld>
             <a:endParaRPr lang="en-GB"/>
           </a:p>
@@ -2189,7 +2189,7 @@
           <a:p>
             <a:fld id="{214A6ADF-3E22-42CC-8AF9-71CE0A99CC1E}" type="datetimeFigureOut">
               <a:rPr lang="en-GB" smtClean="0"/>
-              <a:t>07/04/2024</a:t>
+              <a:t>08/04/2024</a:t>
             </a:fld>
             <a:endParaRPr lang="en-GB"/>
           </a:p>
@@ -2477,7 +2477,7 @@
           <a:p>
             <a:fld id="{214A6ADF-3E22-42CC-8AF9-71CE0A99CC1E}" type="datetimeFigureOut">
               <a:rPr lang="en-GB" smtClean="0"/>
-              <a:t>07/04/2024</a:t>
+              <a:t>08/04/2024</a:t>
             </a:fld>
             <a:endParaRPr lang="en-GB"/>
           </a:p>
@@ -3248,7 +3248,7 @@
           <a:p>
             <a:fld id="{214A6ADF-3E22-42CC-8AF9-71CE0A99CC1E}" type="datetimeFigureOut">
               <a:rPr lang="en-GB" smtClean="0"/>
-              <a:t>07/04/2024</a:t>
+              <a:t>08/04/2024</a:t>
             </a:fld>
             <a:endParaRPr lang="en-GB"/>
           </a:p>
@@ -4496,200 +4496,6 @@
           </a:p>
         </p:txBody>
       </p:sp>
-      <p:pic>
-        <p:nvPicPr>
-          <p:cNvPr id="8194" name="Picture 2"/>
-          <p:cNvPicPr>
-            <a:picLocks noGrp="1" noChangeAspect="1" noChangeArrowheads="1"/>
-          </p:cNvPicPr>
-          <p:nvPr>
-            <p:ph idx="1"/>
-          </p:nvPr>
-        </p:nvPicPr>
-        <p:blipFill>
-          <a:blip r:embed="rId2">
-            <a:extLst>
-              <a:ext uri="{28A0092B-C50C-407E-A947-70E740481C1C}">
-                <a14:useLocalDpi xmlns:a14="http://schemas.microsoft.com/office/drawing/2010/main" val="0"/>
-              </a:ext>
-            </a:extLst>
-          </a:blip>
-          <a:srcRect/>
-          <a:stretch>
-            <a:fillRect/>
-          </a:stretch>
-        </p:blipFill>
-        <p:spPr bwMode="auto">
-          <a:xfrm>
-            <a:off x="467544" y="1923973"/>
-            <a:ext cx="3960440" cy="3502920"/>
-          </a:xfrm>
-          <a:prstGeom prst="rect">
-            <a:avLst/>
-          </a:prstGeom>
-          <a:noFill/>
-          <a:ln>
-            <a:noFill/>
-          </a:ln>
-          <a:effectLst/>
-          <a:extLst>
-            <a:ext uri="{909E8E84-426E-40DD-AFC4-6F175D3DCCD1}">
-              <a14:hiddenFill xmlns:a14="http://schemas.microsoft.com/office/drawing/2010/main">
-                <a:solidFill>
-                  <a:schemeClr val="accent1"/>
-                </a:solidFill>
-              </a14:hiddenFill>
-            </a:ext>
-            <a:ext uri="{91240B29-F687-4F45-9708-019B960494DF}">
-              <a14:hiddenLine xmlns:a14="http://schemas.microsoft.com/office/drawing/2010/main" w="9525">
-                <a:solidFill>
-                  <a:schemeClr val="tx1"/>
-                </a:solidFill>
-                <a:miter lim="800000"/>
-                <a:headEnd/>
-                <a:tailEnd/>
-              </a14:hiddenLine>
-            </a:ext>
-            <a:ext uri="{AF507438-7753-43E0-B8FC-AC1667EBCBE1}">
-              <a14:hiddenEffects xmlns:a14="http://schemas.microsoft.com/office/drawing/2010/main">
-                <a:effectLst>
-                  <a:outerShdw dist="35921" dir="2700000" algn="ctr" rotWithShape="0">
-                    <a:schemeClr val="bg2"/>
-                  </a:outerShdw>
-                </a:effectLst>
-              </a14:hiddenEffects>
-            </a:ext>
-          </a:extLst>
-        </p:spPr>
-      </p:pic>
-      <p:pic>
-        <p:nvPicPr>
-          <p:cNvPr id="8195" name="Picture 3"/>
-          <p:cNvPicPr>
-            <a:picLocks noChangeAspect="1" noChangeArrowheads="1"/>
-          </p:cNvPicPr>
-          <p:nvPr/>
-        </p:nvPicPr>
-        <p:blipFill>
-          <a:blip r:embed="rId3">
-            <a:extLst>
-              <a:ext uri="{28A0092B-C50C-407E-A947-70E740481C1C}">
-                <a14:useLocalDpi xmlns:a14="http://schemas.microsoft.com/office/drawing/2010/main" val="0"/>
-              </a:ext>
-            </a:extLst>
-          </a:blip>
-          <a:srcRect/>
-          <a:stretch>
-            <a:fillRect/>
-          </a:stretch>
-        </p:blipFill>
-        <p:spPr bwMode="auto">
-          <a:xfrm>
-            <a:off x="467544" y="5517232"/>
-            <a:ext cx="3312368" cy="1019175"/>
-          </a:xfrm>
-          <a:prstGeom prst="rect">
-            <a:avLst/>
-          </a:prstGeom>
-          <a:noFill/>
-          <a:ln>
-            <a:noFill/>
-          </a:ln>
-          <a:effectLst/>
-          <a:extLst>
-            <a:ext uri="{909E8E84-426E-40DD-AFC4-6F175D3DCCD1}">
-              <a14:hiddenFill xmlns:a14="http://schemas.microsoft.com/office/drawing/2010/main">
-                <a:solidFill>
-                  <a:schemeClr val="accent1"/>
-                </a:solidFill>
-              </a14:hiddenFill>
-            </a:ext>
-            <a:ext uri="{91240B29-F687-4F45-9708-019B960494DF}">
-              <a14:hiddenLine xmlns:a14="http://schemas.microsoft.com/office/drawing/2010/main" w="9525">
-                <a:solidFill>
-                  <a:schemeClr val="tx1"/>
-                </a:solidFill>
-                <a:miter lim="800000"/>
-                <a:headEnd/>
-                <a:tailEnd/>
-              </a14:hiddenLine>
-            </a:ext>
-            <a:ext uri="{AF507438-7753-43E0-B8FC-AC1667EBCBE1}">
-              <a14:hiddenEffects xmlns:a14="http://schemas.microsoft.com/office/drawing/2010/main">
-                <a:effectLst>
-                  <a:outerShdw dist="35921" dir="2700000" algn="ctr" rotWithShape="0">
-                    <a:schemeClr val="bg2"/>
-                  </a:outerShdw>
-                </a:effectLst>
-              </a14:hiddenEffects>
-            </a:ext>
-          </a:extLst>
-        </p:spPr>
-      </p:pic>
-      <p:pic>
-        <p:nvPicPr>
-          <p:cNvPr id="6" name="Picture 2"/>
-          <p:cNvPicPr>
-            <a:picLocks noChangeAspect="1" noChangeArrowheads="1"/>
-          </p:cNvPicPr>
-          <p:nvPr/>
-        </p:nvPicPr>
-        <p:blipFill>
-          <a:blip r:embed="rId4">
-            <a:extLst>
-              <a:ext uri="{28A0092B-C50C-407E-A947-70E740481C1C}">
-                <a14:useLocalDpi xmlns:a14="http://schemas.microsoft.com/office/drawing/2010/main" val="0"/>
-              </a:ext>
-            </a:extLst>
-          </a:blip>
-          <a:srcRect/>
-          <a:stretch>
-            <a:fillRect/>
-          </a:stretch>
-        </p:blipFill>
-        <p:spPr bwMode="auto">
-          <a:xfrm>
-            <a:off x="4932040" y="1923973"/>
-            <a:ext cx="3744416" cy="2775382"/>
-          </a:xfrm>
-          <a:prstGeom prst="rect">
-            <a:avLst/>
-          </a:prstGeom>
-          <a:noFill/>
-          <a:ln>
-            <a:noFill/>
-          </a:ln>
-          <a:effectLst/>
-          <a:extLst>
-            <a:ext uri="{909E8E84-426E-40DD-AFC4-6F175D3DCCD1}">
-              <a14:hiddenFill xmlns:a14="http://schemas.microsoft.com/office/drawing/2010/main">
-                <a:solidFill>
-                  <a:schemeClr val="accent1"/>
-                </a:solidFill>
-              </a14:hiddenFill>
-            </a:ext>
-            <a:ext uri="{91240B29-F687-4F45-9708-019B960494DF}">
-              <a14:hiddenLine xmlns:a14="http://schemas.microsoft.com/office/drawing/2010/main" w="9525">
-                <a:solidFill>
-                  <a:schemeClr val="tx1"/>
-                </a:solidFill>
-                <a:miter lim="800000"/>
-                <a:headEnd/>
-                <a:tailEnd/>
-              </a14:hiddenLine>
-            </a:ext>
-            <a:ext uri="{AF507438-7753-43E0-B8FC-AC1667EBCBE1}">
-              <a14:hiddenEffects xmlns:a14="http://schemas.microsoft.com/office/drawing/2010/main">
-                <a:effectLst>
-                  <a:outerShdw dist="35921" dir="2700000" algn="ctr" rotWithShape="0">
-                    <a:schemeClr val="bg2"/>
-                  </a:outerShdw>
-                </a:effectLst>
-              </a14:hiddenEffects>
-            </a:ext>
-          </a:extLst>
-        </p:spPr>
-      </p:pic>
       <p:cxnSp>
         <p:nvCxnSpPr>
           <p:cNvPr id="5" name="Straight Connector 4"/>
@@ -4752,6 +4558,200 @@
           </a:fontRef>
         </p:style>
       </p:cxnSp>
+      <p:pic>
+        <p:nvPicPr>
+          <p:cNvPr id="1026" name="Picture 2"/>
+          <p:cNvPicPr>
+            <a:picLocks noGrp="1" noChangeAspect="1" noChangeArrowheads="1"/>
+          </p:cNvPicPr>
+          <p:nvPr>
+            <p:ph idx="1"/>
+          </p:nvPr>
+        </p:nvPicPr>
+        <p:blipFill>
+          <a:blip r:embed="rId2">
+            <a:extLst>
+              <a:ext uri="{28A0092B-C50C-407E-A947-70E740481C1C}">
+                <a14:useLocalDpi xmlns:a14="http://schemas.microsoft.com/office/drawing/2010/main" val="0"/>
+              </a:ext>
+            </a:extLst>
+          </a:blip>
+          <a:srcRect/>
+          <a:stretch>
+            <a:fillRect/>
+          </a:stretch>
+        </p:blipFill>
+        <p:spPr bwMode="auto">
+          <a:xfrm>
+            <a:off x="435255" y="1950404"/>
+            <a:ext cx="3821360" cy="3422812"/>
+          </a:xfrm>
+          <a:prstGeom prst="rect">
+            <a:avLst/>
+          </a:prstGeom>
+          <a:noFill/>
+          <a:ln>
+            <a:noFill/>
+          </a:ln>
+          <a:effectLst/>
+          <a:extLst>
+            <a:ext uri="{909E8E84-426E-40DD-AFC4-6F175D3DCCD1}">
+              <a14:hiddenFill xmlns:a14="http://schemas.microsoft.com/office/drawing/2010/main">
+                <a:solidFill>
+                  <a:schemeClr val="accent1"/>
+                </a:solidFill>
+              </a14:hiddenFill>
+            </a:ext>
+            <a:ext uri="{91240B29-F687-4F45-9708-019B960494DF}">
+              <a14:hiddenLine xmlns:a14="http://schemas.microsoft.com/office/drawing/2010/main" w="9525">
+                <a:solidFill>
+                  <a:schemeClr val="tx1"/>
+                </a:solidFill>
+                <a:miter lim="800000"/>
+                <a:headEnd/>
+                <a:tailEnd/>
+              </a14:hiddenLine>
+            </a:ext>
+            <a:ext uri="{AF507438-7753-43E0-B8FC-AC1667EBCBE1}">
+              <a14:hiddenEffects xmlns:a14="http://schemas.microsoft.com/office/drawing/2010/main">
+                <a:effectLst>
+                  <a:outerShdw dist="35921" dir="2700000" algn="ctr" rotWithShape="0">
+                    <a:schemeClr val="bg2"/>
+                  </a:outerShdw>
+                </a:effectLst>
+              </a14:hiddenEffects>
+            </a:ext>
+          </a:extLst>
+        </p:spPr>
+      </p:pic>
+      <p:pic>
+        <p:nvPicPr>
+          <p:cNvPr id="1027" name="Picture 3"/>
+          <p:cNvPicPr>
+            <a:picLocks noChangeAspect="1" noChangeArrowheads="1"/>
+          </p:cNvPicPr>
+          <p:nvPr/>
+        </p:nvPicPr>
+        <p:blipFill>
+          <a:blip r:embed="rId3">
+            <a:extLst>
+              <a:ext uri="{28A0092B-C50C-407E-A947-70E740481C1C}">
+                <a14:useLocalDpi xmlns:a14="http://schemas.microsoft.com/office/drawing/2010/main" val="0"/>
+              </a:ext>
+            </a:extLst>
+          </a:blip>
+          <a:srcRect/>
+          <a:stretch>
+            <a:fillRect/>
+          </a:stretch>
+        </p:blipFill>
+        <p:spPr bwMode="auto">
+          <a:xfrm>
+            <a:off x="467544" y="5661248"/>
+            <a:ext cx="3744416" cy="838200"/>
+          </a:xfrm>
+          <a:prstGeom prst="rect">
+            <a:avLst/>
+          </a:prstGeom>
+          <a:noFill/>
+          <a:ln>
+            <a:noFill/>
+          </a:ln>
+          <a:effectLst/>
+          <a:extLst>
+            <a:ext uri="{909E8E84-426E-40DD-AFC4-6F175D3DCCD1}">
+              <a14:hiddenFill xmlns:a14="http://schemas.microsoft.com/office/drawing/2010/main">
+                <a:solidFill>
+                  <a:schemeClr val="accent1"/>
+                </a:solidFill>
+              </a14:hiddenFill>
+            </a:ext>
+            <a:ext uri="{91240B29-F687-4F45-9708-019B960494DF}">
+              <a14:hiddenLine xmlns:a14="http://schemas.microsoft.com/office/drawing/2010/main" w="9525">
+                <a:solidFill>
+                  <a:schemeClr val="tx1"/>
+                </a:solidFill>
+                <a:miter lim="800000"/>
+                <a:headEnd/>
+                <a:tailEnd/>
+              </a14:hiddenLine>
+            </a:ext>
+            <a:ext uri="{AF507438-7753-43E0-B8FC-AC1667EBCBE1}">
+              <a14:hiddenEffects xmlns:a14="http://schemas.microsoft.com/office/drawing/2010/main">
+                <a:effectLst>
+                  <a:outerShdw dist="35921" dir="2700000" algn="ctr" rotWithShape="0">
+                    <a:schemeClr val="bg2"/>
+                  </a:outerShdw>
+                </a:effectLst>
+              </a14:hiddenEffects>
+            </a:ext>
+          </a:extLst>
+        </p:spPr>
+      </p:pic>
+      <p:pic>
+        <p:nvPicPr>
+          <p:cNvPr id="1028" name="Picture 4"/>
+          <p:cNvPicPr>
+            <a:picLocks noChangeAspect="1" noChangeArrowheads="1"/>
+          </p:cNvPicPr>
+          <p:nvPr/>
+        </p:nvPicPr>
+        <p:blipFill>
+          <a:blip r:embed="rId4">
+            <a:extLst>
+              <a:ext uri="{28A0092B-C50C-407E-A947-70E740481C1C}">
+                <a14:useLocalDpi xmlns:a14="http://schemas.microsoft.com/office/drawing/2010/main" val="0"/>
+              </a:ext>
+            </a:extLst>
+          </a:blip>
+          <a:srcRect/>
+          <a:stretch>
+            <a:fillRect/>
+          </a:stretch>
+        </p:blipFill>
+        <p:spPr bwMode="auto">
+          <a:xfrm>
+            <a:off x="4788024" y="1988840"/>
+            <a:ext cx="3816424" cy="3024336"/>
+          </a:xfrm>
+          <a:prstGeom prst="rect">
+            <a:avLst/>
+          </a:prstGeom>
+          <a:noFill/>
+          <a:ln>
+            <a:noFill/>
+          </a:ln>
+          <a:effectLst/>
+          <a:extLst>
+            <a:ext uri="{909E8E84-426E-40DD-AFC4-6F175D3DCCD1}">
+              <a14:hiddenFill xmlns:a14="http://schemas.microsoft.com/office/drawing/2010/main">
+                <a:solidFill>
+                  <a:schemeClr val="accent1"/>
+                </a:solidFill>
+              </a14:hiddenFill>
+            </a:ext>
+            <a:ext uri="{91240B29-F687-4F45-9708-019B960494DF}">
+              <a14:hiddenLine xmlns:a14="http://schemas.microsoft.com/office/drawing/2010/main" w="9525">
+                <a:solidFill>
+                  <a:schemeClr val="tx1"/>
+                </a:solidFill>
+                <a:miter lim="800000"/>
+                <a:headEnd/>
+                <a:tailEnd/>
+              </a14:hiddenLine>
+            </a:ext>
+            <a:ext uri="{AF507438-7753-43E0-B8FC-AC1667EBCBE1}">
+              <a14:hiddenEffects xmlns:a14="http://schemas.microsoft.com/office/drawing/2010/main">
+                <a:effectLst>
+                  <a:outerShdw dist="35921" dir="2700000" algn="ctr" rotWithShape="0">
+                    <a:schemeClr val="bg2"/>
+                  </a:outerShdw>
+                </a:effectLst>
+              </a14:hiddenEffects>
+            </a:ext>
+          </a:extLst>
+        </p:spPr>
+      </p:pic>
     </p:spTree>
     <p:extLst>
       <p:ext uri="{BB962C8B-B14F-4D97-AF65-F5344CB8AC3E}">
@@ -4830,7 +4830,7 @@
       </p:sp>
       <p:pic>
         <p:nvPicPr>
-          <p:cNvPr id="9219" name="Picture 3"/>
+          <p:cNvPr id="2050" name="Picture 2"/>
           <p:cNvPicPr>
             <a:picLocks noChangeAspect="1" noChangeArrowheads="1"/>
           </p:cNvPicPr>
@@ -4851,8 +4851,8 @@
         </p:blipFill>
         <p:spPr bwMode="auto">
           <a:xfrm>
-            <a:off x="467544" y="2492896"/>
-            <a:ext cx="8242209" cy="3816424"/>
+            <a:off x="395536" y="2420888"/>
+            <a:ext cx="6989836" cy="4143498"/>
           </a:xfrm>
           <a:prstGeom prst="rect">
             <a:avLst/>
@@ -4990,134 +4990,6 @@
           </a:p>
         </p:txBody>
       </p:sp>
-      <p:pic>
-        <p:nvPicPr>
-          <p:cNvPr id="10242" name="Picture 2"/>
-          <p:cNvPicPr>
-            <a:picLocks noChangeAspect="1" noChangeArrowheads="1"/>
-          </p:cNvPicPr>
-          <p:nvPr/>
-        </p:nvPicPr>
-        <p:blipFill>
-          <a:blip r:embed="rId2">
-            <a:extLst>
-              <a:ext uri="{28A0092B-C50C-407E-A947-70E740481C1C}">
-                <a14:useLocalDpi xmlns:a14="http://schemas.microsoft.com/office/drawing/2010/main" val="0"/>
-              </a:ext>
-            </a:extLst>
-          </a:blip>
-          <a:srcRect/>
-          <a:stretch>
-            <a:fillRect/>
-          </a:stretch>
-        </p:blipFill>
-        <p:spPr bwMode="auto">
-          <a:xfrm>
-            <a:off x="323528" y="2492896"/>
-            <a:ext cx="4086225" cy="3676650"/>
-          </a:xfrm>
-          <a:prstGeom prst="rect">
-            <a:avLst/>
-          </a:prstGeom>
-          <a:noFill/>
-          <a:ln>
-            <a:noFill/>
-          </a:ln>
-          <a:effectLst/>
-          <a:extLst>
-            <a:ext uri="{909E8E84-426E-40DD-AFC4-6F175D3DCCD1}">
-              <a14:hiddenFill xmlns:a14="http://schemas.microsoft.com/office/drawing/2010/main">
-                <a:solidFill>
-                  <a:schemeClr val="accent1"/>
-                </a:solidFill>
-              </a14:hiddenFill>
-            </a:ext>
-            <a:ext uri="{91240B29-F687-4F45-9708-019B960494DF}">
-              <a14:hiddenLine xmlns:a14="http://schemas.microsoft.com/office/drawing/2010/main" w="9525">
-                <a:solidFill>
-                  <a:schemeClr val="tx1"/>
-                </a:solidFill>
-                <a:miter lim="800000"/>
-                <a:headEnd/>
-                <a:tailEnd/>
-              </a14:hiddenLine>
-            </a:ext>
-            <a:ext uri="{AF507438-7753-43E0-B8FC-AC1667EBCBE1}">
-              <a14:hiddenEffects xmlns:a14="http://schemas.microsoft.com/office/drawing/2010/main">
-                <a:effectLst>
-                  <a:outerShdw dist="35921" dir="2700000" algn="ctr" rotWithShape="0">
-                    <a:schemeClr val="bg2"/>
-                  </a:outerShdw>
-                </a:effectLst>
-              </a14:hiddenEffects>
-            </a:ext>
-          </a:extLst>
-        </p:spPr>
-      </p:pic>
-      <p:pic>
-        <p:nvPicPr>
-          <p:cNvPr id="10243" name="Picture 3"/>
-          <p:cNvPicPr>
-            <a:picLocks noChangeAspect="1" noChangeArrowheads="1"/>
-          </p:cNvPicPr>
-          <p:nvPr/>
-        </p:nvPicPr>
-        <p:blipFill>
-          <a:blip r:embed="rId3">
-            <a:extLst>
-              <a:ext uri="{28A0092B-C50C-407E-A947-70E740481C1C}">
-                <a14:useLocalDpi xmlns:a14="http://schemas.microsoft.com/office/drawing/2010/main" val="0"/>
-              </a:ext>
-            </a:extLst>
-          </a:blip>
-          <a:srcRect/>
-          <a:stretch>
-            <a:fillRect/>
-          </a:stretch>
-        </p:blipFill>
-        <p:spPr bwMode="auto">
-          <a:xfrm>
-            <a:off x="4716016" y="2526116"/>
-            <a:ext cx="4219575" cy="3667125"/>
-          </a:xfrm>
-          <a:prstGeom prst="rect">
-            <a:avLst/>
-          </a:prstGeom>
-          <a:noFill/>
-          <a:ln>
-            <a:noFill/>
-          </a:ln>
-          <a:effectLst/>
-          <a:extLst>
-            <a:ext uri="{909E8E84-426E-40DD-AFC4-6F175D3DCCD1}">
-              <a14:hiddenFill xmlns:a14="http://schemas.microsoft.com/office/drawing/2010/main">
-                <a:solidFill>
-                  <a:schemeClr val="accent1"/>
-                </a:solidFill>
-              </a14:hiddenFill>
-            </a:ext>
-            <a:ext uri="{91240B29-F687-4F45-9708-019B960494DF}">
-              <a14:hiddenLine xmlns:a14="http://schemas.microsoft.com/office/drawing/2010/main" w="9525">
-                <a:solidFill>
-                  <a:schemeClr val="tx1"/>
-                </a:solidFill>
-                <a:miter lim="800000"/>
-                <a:headEnd/>
-                <a:tailEnd/>
-              </a14:hiddenLine>
-            </a:ext>
-            <a:ext uri="{AF507438-7753-43E0-B8FC-AC1667EBCBE1}">
-              <a14:hiddenEffects xmlns:a14="http://schemas.microsoft.com/office/drawing/2010/main">
-                <a:effectLst>
-                  <a:outerShdw dist="35921" dir="2700000" algn="ctr" rotWithShape="0">
-                    <a:schemeClr val="bg2"/>
-                  </a:outerShdw>
-                </a:effectLst>
-              </a14:hiddenEffects>
-            </a:ext>
-          </a:extLst>
-        </p:spPr>
-      </p:pic>
       <p:cxnSp>
         <p:nvCxnSpPr>
           <p:cNvPr id="5" name="Straight Connector 4"/>
@@ -5180,6 +5052,134 @@
           </a:fontRef>
         </p:style>
       </p:cxnSp>
+      <p:pic>
+        <p:nvPicPr>
+          <p:cNvPr id="3074" name="Picture 2"/>
+          <p:cNvPicPr>
+            <a:picLocks noChangeAspect="1" noChangeArrowheads="1"/>
+          </p:cNvPicPr>
+          <p:nvPr/>
+        </p:nvPicPr>
+        <p:blipFill>
+          <a:blip r:embed="rId2">
+            <a:extLst>
+              <a:ext uri="{28A0092B-C50C-407E-A947-70E740481C1C}">
+                <a14:useLocalDpi xmlns:a14="http://schemas.microsoft.com/office/drawing/2010/main" val="0"/>
+              </a:ext>
+            </a:extLst>
+          </a:blip>
+          <a:srcRect/>
+          <a:stretch>
+            <a:fillRect/>
+          </a:stretch>
+        </p:blipFill>
+        <p:spPr bwMode="auto">
+          <a:xfrm>
+            <a:off x="179512" y="2555460"/>
+            <a:ext cx="4176464" cy="3637781"/>
+          </a:xfrm>
+          <a:prstGeom prst="rect">
+            <a:avLst/>
+          </a:prstGeom>
+          <a:noFill/>
+          <a:ln>
+            <a:noFill/>
+          </a:ln>
+          <a:effectLst/>
+          <a:extLst>
+            <a:ext uri="{909E8E84-426E-40DD-AFC4-6F175D3DCCD1}">
+              <a14:hiddenFill xmlns:a14="http://schemas.microsoft.com/office/drawing/2010/main">
+                <a:solidFill>
+                  <a:schemeClr val="accent1"/>
+                </a:solidFill>
+              </a14:hiddenFill>
+            </a:ext>
+            <a:ext uri="{91240B29-F687-4F45-9708-019B960494DF}">
+              <a14:hiddenLine xmlns:a14="http://schemas.microsoft.com/office/drawing/2010/main" w="9525">
+                <a:solidFill>
+                  <a:schemeClr val="tx1"/>
+                </a:solidFill>
+                <a:miter lim="800000"/>
+                <a:headEnd/>
+                <a:tailEnd/>
+              </a14:hiddenLine>
+            </a:ext>
+            <a:ext uri="{AF507438-7753-43E0-B8FC-AC1667EBCBE1}">
+              <a14:hiddenEffects xmlns:a14="http://schemas.microsoft.com/office/drawing/2010/main">
+                <a:effectLst>
+                  <a:outerShdw dist="35921" dir="2700000" algn="ctr" rotWithShape="0">
+                    <a:schemeClr val="bg2"/>
+                  </a:outerShdw>
+                </a:effectLst>
+              </a14:hiddenEffects>
+            </a:ext>
+          </a:extLst>
+        </p:spPr>
+      </p:pic>
+      <p:pic>
+        <p:nvPicPr>
+          <p:cNvPr id="3075" name="Picture 3"/>
+          <p:cNvPicPr>
+            <a:picLocks noChangeAspect="1" noChangeArrowheads="1"/>
+          </p:cNvPicPr>
+          <p:nvPr/>
+        </p:nvPicPr>
+        <p:blipFill>
+          <a:blip r:embed="rId3">
+            <a:extLst>
+              <a:ext uri="{28A0092B-C50C-407E-A947-70E740481C1C}">
+                <a14:useLocalDpi xmlns:a14="http://schemas.microsoft.com/office/drawing/2010/main" val="0"/>
+              </a:ext>
+            </a:extLst>
+          </a:blip>
+          <a:srcRect/>
+          <a:stretch>
+            <a:fillRect/>
+          </a:stretch>
+        </p:blipFill>
+        <p:spPr bwMode="auto">
+          <a:xfrm>
+            <a:off x="4716016" y="2589740"/>
+            <a:ext cx="4276725" cy="3733800"/>
+          </a:xfrm>
+          <a:prstGeom prst="rect">
+            <a:avLst/>
+          </a:prstGeom>
+          <a:noFill/>
+          <a:ln>
+            <a:noFill/>
+          </a:ln>
+          <a:effectLst/>
+          <a:extLst>
+            <a:ext uri="{909E8E84-426E-40DD-AFC4-6F175D3DCCD1}">
+              <a14:hiddenFill xmlns:a14="http://schemas.microsoft.com/office/drawing/2010/main">
+                <a:solidFill>
+                  <a:schemeClr val="accent1"/>
+                </a:solidFill>
+              </a14:hiddenFill>
+            </a:ext>
+            <a:ext uri="{91240B29-F687-4F45-9708-019B960494DF}">
+              <a14:hiddenLine xmlns:a14="http://schemas.microsoft.com/office/drawing/2010/main" w="9525">
+                <a:solidFill>
+                  <a:schemeClr val="tx1"/>
+                </a:solidFill>
+                <a:miter lim="800000"/>
+                <a:headEnd/>
+                <a:tailEnd/>
+              </a14:hiddenLine>
+            </a:ext>
+            <a:ext uri="{AF507438-7753-43E0-B8FC-AC1667EBCBE1}">
+              <a14:hiddenEffects xmlns:a14="http://schemas.microsoft.com/office/drawing/2010/main">
+                <a:effectLst>
+                  <a:outerShdw dist="35921" dir="2700000" algn="ctr" rotWithShape="0">
+                    <a:schemeClr val="bg2"/>
+                  </a:outerShdw>
+                </a:effectLst>
+              </a14:hiddenEffects>
+            </a:ext>
+          </a:extLst>
+        </p:spPr>
+      </p:pic>
     </p:spTree>
     <p:extLst>
       <p:ext uri="{BB962C8B-B14F-4D97-AF65-F5344CB8AC3E}">
@@ -5241,7 +5241,7 @@
       </p:sp>
       <p:sp>
         <p:nvSpPr>
-          <p:cNvPr id="3" name="Content Placeholder 2"/>
+          <p:cNvPr id="4" name="Content Placeholder 3"/>
           <p:cNvSpPr>
             <a:spLocks noGrp="1"/>
           </p:cNvSpPr>
@@ -5254,10 +5254,270 @@
           <a:bodyPr/>
           <a:lstStyle/>
           <a:p>
-            <a:endParaRPr lang="en-GB"/>
-          </a:p>
-        </p:txBody>
-      </p:sp>
+            <a:pPr marL="0" indent="0">
+              <a:buNone/>
+            </a:pPr>
+            <a:r>
+              <a:rPr lang="en-GB" dirty="0"/>
+              <a:t>Random Forest </a:t>
+            </a:r>
+            <a:r>
+              <a:rPr lang="en-GB" dirty="0" smtClean="0"/>
+              <a:t>model			Decision </a:t>
+            </a:r>
+            <a:r>
+              <a:rPr lang="en-GB" dirty="0"/>
+              <a:t>Tree</a:t>
+            </a:r>
+          </a:p>
+          <a:p>
+            <a:pPr marL="0" indent="0">
+              <a:buNone/>
+            </a:pPr>
+            <a:r>
+              <a:rPr lang="en-GB" dirty="0" smtClean="0"/>
+              <a:t>		</a:t>
+            </a:r>
+            <a:endParaRPr lang="en-GB" dirty="0"/>
+          </a:p>
+          <a:p>
+            <a:r>
+              <a:rPr lang="en-GB" dirty="0" smtClean="0"/>
+              <a:t>		</a:t>
+            </a:r>
+          </a:p>
+          <a:p>
+            <a:endParaRPr lang="en-GB" dirty="0"/>
+          </a:p>
+        </p:txBody>
+      </p:sp>
+      <p:pic>
+        <p:nvPicPr>
+          <p:cNvPr id="4099" name="Picture 3"/>
+          <p:cNvPicPr>
+            <a:picLocks noChangeAspect="1" noChangeArrowheads="1"/>
+          </p:cNvPicPr>
+          <p:nvPr/>
+        </p:nvPicPr>
+        <p:blipFill>
+          <a:blip r:embed="rId2">
+            <a:extLst>
+              <a:ext uri="{28A0092B-C50C-407E-A947-70E740481C1C}">
+                <a14:useLocalDpi xmlns:a14="http://schemas.microsoft.com/office/drawing/2010/main" val="0"/>
+              </a:ext>
+            </a:extLst>
+          </a:blip>
+          <a:srcRect/>
+          <a:stretch>
+            <a:fillRect/>
+          </a:stretch>
+        </p:blipFill>
+        <p:spPr bwMode="auto">
+          <a:xfrm>
+            <a:off x="179513" y="2415612"/>
+            <a:ext cx="4320480" cy="4392488"/>
+          </a:xfrm>
+          <a:prstGeom prst="rect">
+            <a:avLst/>
+          </a:prstGeom>
+          <a:noFill/>
+          <a:ln>
+            <a:noFill/>
+          </a:ln>
+          <a:effectLst/>
+          <a:extLst>
+            <a:ext uri="{909E8E84-426E-40DD-AFC4-6F175D3DCCD1}">
+              <a14:hiddenFill xmlns:a14="http://schemas.microsoft.com/office/drawing/2010/main">
+                <a:solidFill>
+                  <a:schemeClr val="accent1"/>
+                </a:solidFill>
+              </a14:hiddenFill>
+            </a:ext>
+            <a:ext uri="{91240B29-F687-4F45-9708-019B960494DF}">
+              <a14:hiddenLine xmlns:a14="http://schemas.microsoft.com/office/drawing/2010/main" w="9525">
+                <a:solidFill>
+                  <a:schemeClr val="tx1"/>
+                </a:solidFill>
+                <a:miter lim="800000"/>
+                <a:headEnd/>
+                <a:tailEnd/>
+              </a14:hiddenLine>
+            </a:ext>
+            <a:ext uri="{AF507438-7753-43E0-B8FC-AC1667EBCBE1}">
+              <a14:hiddenEffects xmlns:a14="http://schemas.microsoft.com/office/drawing/2010/main">
+                <a:effectLst>
+                  <a:outerShdw dist="35921" dir="2700000" algn="ctr" rotWithShape="0">
+                    <a:schemeClr val="bg2"/>
+                  </a:outerShdw>
+                </a:effectLst>
+              </a14:hiddenEffects>
+            </a:ext>
+          </a:extLst>
+        </p:spPr>
+      </p:pic>
+      <p:pic>
+        <p:nvPicPr>
+          <p:cNvPr id="4101" name="Picture 5"/>
+          <p:cNvPicPr>
+            <a:picLocks noChangeAspect="1" noChangeArrowheads="1"/>
+          </p:cNvPicPr>
+          <p:nvPr/>
+        </p:nvPicPr>
+        <p:blipFill>
+          <a:blip r:embed="rId3">
+            <a:extLst>
+              <a:ext uri="{28A0092B-C50C-407E-A947-70E740481C1C}">
+                <a14:useLocalDpi xmlns:a14="http://schemas.microsoft.com/office/drawing/2010/main" val="0"/>
+              </a:ext>
+            </a:extLst>
+          </a:blip>
+          <a:srcRect/>
+          <a:stretch>
+            <a:fillRect/>
+          </a:stretch>
+        </p:blipFill>
+        <p:spPr bwMode="auto">
+          <a:xfrm>
+            <a:off x="4716016" y="2636912"/>
+            <a:ext cx="4207663" cy="3816424"/>
+          </a:xfrm>
+          <a:prstGeom prst="rect">
+            <a:avLst/>
+          </a:prstGeom>
+          <a:noFill/>
+          <a:ln>
+            <a:noFill/>
+          </a:ln>
+          <a:effectLst/>
+          <a:extLst>
+            <a:ext uri="{909E8E84-426E-40DD-AFC4-6F175D3DCCD1}">
+              <a14:hiddenFill xmlns:a14="http://schemas.microsoft.com/office/drawing/2010/main">
+                <a:solidFill>
+                  <a:schemeClr val="accent1"/>
+                </a:solidFill>
+              </a14:hiddenFill>
+            </a:ext>
+            <a:ext uri="{91240B29-F687-4F45-9708-019B960494DF}">
+              <a14:hiddenLine xmlns:a14="http://schemas.microsoft.com/office/drawing/2010/main" w="9525">
+                <a:solidFill>
+                  <a:schemeClr val="tx1"/>
+                </a:solidFill>
+                <a:miter lim="800000"/>
+                <a:headEnd/>
+                <a:tailEnd/>
+              </a14:hiddenLine>
+            </a:ext>
+            <a:ext uri="{AF507438-7753-43E0-B8FC-AC1667EBCBE1}">
+              <a14:hiddenEffects xmlns:a14="http://schemas.microsoft.com/office/drawing/2010/main">
+                <a:effectLst>
+                  <a:outerShdw dist="35921" dir="2700000" algn="ctr" rotWithShape="0">
+                    <a:schemeClr val="bg2"/>
+                  </a:outerShdw>
+                </a:effectLst>
+              </a14:hiddenEffects>
+            </a:ext>
+          </a:extLst>
+        </p:spPr>
+      </p:pic>
+      <p:cxnSp>
+        <p:nvCxnSpPr>
+          <p:cNvPr id="6" name="Straight Connector 5"/>
+          <p:cNvCxnSpPr/>
+          <p:nvPr/>
+        </p:nvCxnSpPr>
+        <p:spPr>
+          <a:xfrm>
+            <a:off x="0" y="2415612"/>
+            <a:ext cx="9144000" cy="0"/>
+          </a:xfrm>
+          <a:prstGeom prst="line">
+            <a:avLst/>
+          </a:prstGeom>
+          <a:ln w="38100"/>
+        </p:spPr>
+        <p:style>
+          <a:lnRef idx="1">
+            <a:schemeClr val="accent1"/>
+          </a:lnRef>
+          <a:fillRef idx="0">
+            <a:schemeClr val="accent1"/>
+          </a:fillRef>
+          <a:effectRef idx="0">
+            <a:schemeClr val="accent1"/>
+          </a:effectRef>
+          <a:fontRef idx="minor">
+            <a:schemeClr val="tx1"/>
+          </a:fontRef>
+        </p:style>
+      </p:cxnSp>
+      <p:cxnSp>
+        <p:nvCxnSpPr>
+          <p:cNvPr id="8" name="Straight Connector 7"/>
+          <p:cNvCxnSpPr>
+            <a:stCxn id="2" idx="2"/>
+          </p:cNvCxnSpPr>
+          <p:nvPr/>
+        </p:nvCxnSpPr>
+        <p:spPr>
+          <a:xfrm>
+            <a:off x="4572000" y="1847088"/>
+            <a:ext cx="72008" cy="5010912"/>
+          </a:xfrm>
+          <a:prstGeom prst="line">
+            <a:avLst/>
+          </a:prstGeom>
+          <a:ln w="28575">
+            <a:solidFill>
+              <a:schemeClr val="accent1"/>
+            </a:solidFill>
+          </a:ln>
+        </p:spPr>
+        <p:style>
+          <a:lnRef idx="1">
+            <a:schemeClr val="accent1"/>
+          </a:lnRef>
+          <a:fillRef idx="0">
+            <a:schemeClr val="accent1"/>
+          </a:fillRef>
+          <a:effectRef idx="0">
+            <a:schemeClr val="accent1"/>
+          </a:effectRef>
+          <a:fontRef idx="minor">
+            <a:schemeClr val="tx1"/>
+          </a:fontRef>
+        </p:style>
+      </p:cxnSp>
+      <p:cxnSp>
+        <p:nvCxnSpPr>
+          <p:cNvPr id="11" name="Straight Connector 10"/>
+          <p:cNvCxnSpPr/>
+          <p:nvPr/>
+        </p:nvCxnSpPr>
+        <p:spPr>
+          <a:xfrm>
+            <a:off x="0" y="1844824"/>
+            <a:ext cx="9144000" cy="0"/>
+          </a:xfrm>
+          <a:prstGeom prst="line">
+            <a:avLst/>
+          </a:prstGeom>
+          <a:ln w="38100"/>
+        </p:spPr>
+        <p:style>
+          <a:lnRef idx="1">
+            <a:schemeClr val="accent1"/>
+          </a:lnRef>
+          <a:fillRef idx="0">
+            <a:schemeClr val="accent1"/>
+          </a:fillRef>
+          <a:effectRef idx="0">
+            <a:schemeClr val="accent1"/>
+          </a:effectRef>
+          <a:fontRef idx="minor">
+            <a:schemeClr val="tx1"/>
+          </a:fontRef>
+        </p:style>
+      </p:cxnSp>
     </p:spTree>
     <p:extLst>
       <p:ext uri="{BB962C8B-B14F-4D97-AF65-F5344CB8AC3E}">
@@ -5300,32 +5560,153 @@
         </p:nvSpPr>
         <p:spPr/>
         <p:txBody>
-          <a:bodyPr/>
-          <a:lstStyle/>
-          <a:p>
-            <a:endParaRPr lang="en-GB"/>
-          </a:p>
-        </p:txBody>
-      </p:sp>
-      <p:sp>
-        <p:nvSpPr>
-          <p:cNvPr id="3" name="Content Placeholder 2"/>
-          <p:cNvSpPr>
-            <a:spLocks noGrp="1"/>
-          </p:cNvSpPr>
+          <a:bodyPr>
+            <a:normAutofit/>
+          </a:bodyPr>
+          <a:lstStyle/>
+          <a:p>
+            <a:r>
+              <a:rPr lang="en-GB" dirty="0"/>
+              <a:t>Gradient </a:t>
+            </a:r>
+            <a:r>
+              <a:rPr lang="en-GB" dirty="0" smtClean="0"/>
+              <a:t>boosting</a:t>
+            </a:r>
+            <a:endParaRPr lang="en-GB" dirty="0"/>
+          </a:p>
+        </p:txBody>
+      </p:sp>
+      <p:pic>
+        <p:nvPicPr>
+          <p:cNvPr id="5122" name="Picture 2"/>
+          <p:cNvPicPr>
+            <a:picLocks noGrp="1" noChangeAspect="1" noChangeArrowheads="1"/>
+          </p:cNvPicPr>
           <p:nvPr>
             <p:ph idx="1"/>
           </p:nvPr>
-        </p:nvSpPr>
-        <p:spPr/>
-        <p:txBody>
-          <a:bodyPr/>
-          <a:lstStyle/>
-          <a:p>
-            <a:endParaRPr lang="en-GB"/>
-          </a:p>
-        </p:txBody>
-      </p:sp>
+        </p:nvPicPr>
+        <p:blipFill>
+          <a:blip r:embed="rId2">
+            <a:extLst>
+              <a:ext uri="{28A0092B-C50C-407E-A947-70E740481C1C}">
+                <a14:useLocalDpi xmlns:a14="http://schemas.microsoft.com/office/drawing/2010/main" val="0"/>
+              </a:ext>
+            </a:extLst>
+          </a:blip>
+          <a:srcRect/>
+          <a:stretch>
+            <a:fillRect/>
+          </a:stretch>
+        </p:blipFill>
+        <p:spPr bwMode="auto">
+          <a:xfrm>
+            <a:off x="4283968" y="2132856"/>
+            <a:ext cx="4042792" cy="3977398"/>
+          </a:xfrm>
+          <a:prstGeom prst="rect">
+            <a:avLst/>
+          </a:prstGeom>
+          <a:noFill/>
+          <a:ln>
+            <a:noFill/>
+          </a:ln>
+          <a:effectLst/>
+          <a:extLst>
+            <a:ext uri="{909E8E84-426E-40DD-AFC4-6F175D3DCCD1}">
+              <a14:hiddenFill xmlns:a14="http://schemas.microsoft.com/office/drawing/2010/main">
+                <a:solidFill>
+                  <a:schemeClr val="accent1"/>
+                </a:solidFill>
+              </a14:hiddenFill>
+            </a:ext>
+            <a:ext uri="{91240B29-F687-4F45-9708-019B960494DF}">
+              <a14:hiddenLine xmlns:a14="http://schemas.microsoft.com/office/drawing/2010/main" w="9525">
+                <a:solidFill>
+                  <a:schemeClr val="tx1"/>
+                </a:solidFill>
+                <a:miter lim="800000"/>
+                <a:headEnd/>
+                <a:tailEnd/>
+              </a14:hiddenLine>
+            </a:ext>
+            <a:ext uri="{AF507438-7753-43E0-B8FC-AC1667EBCBE1}">
+              <a14:hiddenEffects xmlns:a14="http://schemas.microsoft.com/office/drawing/2010/main">
+                <a:effectLst>
+                  <a:outerShdw dist="35921" dir="2700000" algn="ctr" rotWithShape="0">
+                    <a:schemeClr val="bg2"/>
+                  </a:outerShdw>
+                </a:effectLst>
+              </a14:hiddenEffects>
+            </a:ext>
+          </a:extLst>
+        </p:spPr>
+      </p:pic>
+      <p:pic>
+        <p:nvPicPr>
+          <p:cNvPr id="5123" name="Picture 3"/>
+          <p:cNvPicPr>
+            <a:picLocks noChangeAspect="1" noChangeArrowheads="1"/>
+          </p:cNvPicPr>
+          <p:nvPr/>
+        </p:nvPicPr>
+        <p:blipFill>
+          <a:blip r:embed="rId3">
+            <a:extLst>
+              <a:ext uri="{28A0092B-C50C-407E-A947-70E740481C1C}">
+                <a14:useLocalDpi xmlns:a14="http://schemas.microsoft.com/office/drawing/2010/main" val="0"/>
+              </a:ext>
+            </a:extLst>
+          </a:blip>
+          <a:srcRect/>
+          <a:stretch>
+            <a:fillRect/>
+          </a:stretch>
+        </p:blipFill>
+        <p:spPr bwMode="auto">
+          <a:xfrm>
+            <a:off x="323528" y="1988840"/>
+            <a:ext cx="3672407" cy="4104456"/>
+          </a:xfrm>
+          <a:prstGeom prst="rect">
+            <a:avLst/>
+          </a:prstGeom>
+          <a:noFill/>
+          <a:ln>
+            <a:noFill/>
+          </a:ln>
+          <a:effectLst/>
+          <a:extLst>
+            <a:ext uri="{909E8E84-426E-40DD-AFC4-6F175D3DCCD1}">
+              <a14:hiddenFill xmlns:a14="http://schemas.microsoft.com/office/drawing/2010/main">
+                <a:solidFill>
+                  <a:schemeClr val="accent1"/>
+                </a:solidFill>
+              </a14:hiddenFill>
+            </a:ext>
+            <a:ext uri="{91240B29-F687-4F45-9708-019B960494DF}">
+              <a14:hiddenLine xmlns:a14="http://schemas.microsoft.com/office/drawing/2010/main" w="9525">
+                <a:solidFill>
+                  <a:schemeClr val="tx1"/>
+                </a:solidFill>
+                <a:miter lim="800000"/>
+                <a:headEnd/>
+                <a:tailEnd/>
+              </a14:hiddenLine>
+            </a:ext>
+            <a:ext uri="{AF507438-7753-43E0-B8FC-AC1667EBCBE1}">
+              <a14:hiddenEffects xmlns:a14="http://schemas.microsoft.com/office/drawing/2010/main">
+                <a:effectLst>
+                  <a:outerShdw dist="35921" dir="2700000" algn="ctr" rotWithShape="0">
+                    <a:schemeClr val="bg2"/>
+                  </a:outerShdw>
+                </a:effectLst>
+              </a14:hiddenEffects>
+            </a:ext>
+          </a:extLst>
+        </p:spPr>
+      </p:pic>
     </p:spTree>
     <p:extLst>
       <p:ext uri="{BB962C8B-B14F-4D97-AF65-F5344CB8AC3E}">
@@ -5371,7 +5752,12 @@
           <a:bodyPr/>
           <a:lstStyle/>
           <a:p>
-            <a:endParaRPr lang="en-GB"/>
+            <a:pPr algn="ctr"/>
+            <a:r>
+              <a:rPr lang="en-GB" dirty="0"/>
+              <a:t>Recommendations</a:t>
+            </a:r>
+            <a:endParaRPr lang="en-GB" dirty="0"/>
           </a:p>
         </p:txBody>
       </p:sp>
@@ -5387,17 +5773,51 @@
         </p:nvSpPr>
         <p:spPr/>
         <p:txBody>
-          <a:bodyPr/>
-          <a:lstStyle/>
-          <a:p>
-            <a:endParaRPr lang="en-GB"/>
+          <a:bodyPr>
+            <a:normAutofit fontScale="85000" lnSpcReduction="20000"/>
+          </a:bodyPr>
+          <a:lstStyle/>
+          <a:p>
+            <a:r>
+              <a:rPr lang="en-GB" dirty="0"/>
+              <a:t>Focus on boosting memory in premium phone models, especially for customers who care about performance. Let them know about this in your marketing.</a:t>
+            </a:r>
+          </a:p>
+          <a:p>
+            <a:r>
+              <a:rPr lang="en-GB" dirty="0"/>
+              <a:t>Understand that different groups of people want different things from their phones. For example, gamers might care more about how fast the processor is and how much RAM there is, while </a:t>
+            </a:r>
+            <a:r>
+              <a:rPr lang="en-GB" dirty="0" smtClean="0"/>
+              <a:t>travellers </a:t>
+            </a:r>
+            <a:r>
+              <a:rPr lang="en-GB" dirty="0"/>
+              <a:t>might care more about battery life and durability.</a:t>
+            </a:r>
+          </a:p>
+          <a:p>
+            <a:r>
+              <a:rPr lang="en-GB" dirty="0"/>
+              <a:t>Keep an eye on what your competitors are doing. See how they're promoting their products based on these key features. This can help you understand what's popular in the market and what customers expect.</a:t>
+            </a:r>
+          </a:p>
+          <a:p>
+            <a:r>
+              <a:rPr lang="en-GB" dirty="0"/>
+              <a:t>Talk to your customers directly to find out what they think. Ask them which features are most important to them and how they feel about your products compared to others. This feedback can be really valuable for improving your offerings.</a:t>
+            </a:r>
+          </a:p>
+          <a:p>
+            <a:endParaRPr lang="en-GB" dirty="0"/>
           </a:p>
         </p:txBody>
       </p:sp>
     </p:spTree>
     <p:extLst>
       <p:ext uri="{BB962C8B-B14F-4D97-AF65-F5344CB8AC3E}">
-        <p14:creationId xmlns:p14="http://schemas.microsoft.com/office/powerpoint/2010/main" val="1668677941"/>
+        <p14:creationId xmlns:p14="http://schemas.microsoft.com/office/powerpoint/2010/main" val="3930522361"/>
       </p:ext>
     </p:extLst>
   </p:cSld>
@@ -5567,7 +5987,12 @@
           <a:bodyPr/>
           <a:lstStyle/>
           <a:p>
-            <a:endParaRPr lang="en-GB"/>
+            <a:pPr algn="ctr"/>
+            <a:r>
+              <a:rPr lang="en-GB" dirty="0"/>
+              <a:t>Conclusion</a:t>
+            </a:r>
+            <a:endParaRPr lang="en-GB" dirty="0"/>
           </a:p>
         </p:txBody>
       </p:sp>
@@ -5583,17 +6008,37 @@
         </p:nvSpPr>
         <p:spPr/>
         <p:txBody>
-          <a:bodyPr/>
-          <a:lstStyle/>
-          <a:p>
-            <a:endParaRPr lang="en-GB"/>
+          <a:bodyPr>
+            <a:normAutofit fontScale="92500" lnSpcReduction="10000"/>
+          </a:bodyPr>
+          <a:lstStyle/>
+          <a:p>
+            <a:r>
+              <a:rPr lang="en-GB" dirty="0" smtClean="0"/>
+              <a:t>When </a:t>
+            </a:r>
+            <a:r>
+              <a:rPr lang="en-GB" dirty="0"/>
+              <a:t>we use Principal Component Analysis (PCA) to understand data, the first few components capture the most important information. In this case, PC1 is the most important, showing that it holds a lot of the key details for predicting mobile phone prices. PC2 is also important but not as much as PC1.</a:t>
+            </a:r>
+          </a:p>
+          <a:p>
+            <a:r>
+              <a:rPr lang="en-GB" dirty="0"/>
+              <a:t>When we look at memory size (RAM and storage) in phones, we see that having more memory and storage tends to make a phone more expensive. This is good news for people who care about performance because it means they're getting their money's worth when they buy phones with more memory and storage</a:t>
+            </a:r>
+            <a:r>
+              <a:rPr lang="en-GB" dirty="0" smtClean="0"/>
+              <a:t>.</a:t>
+            </a:r>
+            <a:endParaRPr lang="en-GB" dirty="0"/>
           </a:p>
         </p:txBody>
       </p:sp>
     </p:spTree>
     <p:extLst>
       <p:ext uri="{BB962C8B-B14F-4D97-AF65-F5344CB8AC3E}">
-        <p14:creationId xmlns:p14="http://schemas.microsoft.com/office/powerpoint/2010/main" val="3930522361"/>
+        <p14:creationId xmlns:p14="http://schemas.microsoft.com/office/powerpoint/2010/main" val="1668677941"/>
       </p:ext>
     </p:extLst>
   </p:cSld>
@@ -6003,11 +6448,7 @@
             </a:br>
             <a:r>
               <a:rPr lang="en-GB" dirty="0" smtClean="0"/>
-              <a:t>Load </a:t>
-            </a:r>
-            <a:r>
-              <a:rPr lang="en-GB" dirty="0" smtClean="0"/>
-              <a:t>and exploration the data</a:t>
+              <a:t>Load and exploration the data</a:t>
             </a:r>
             <a:endParaRPr lang="en-GB" dirty="0"/>
           </a:p>
@@ -6101,7 +6542,6 @@
               <a:rPr lang="en-GB" sz="1600" dirty="0" smtClean="0"/>
               <a:t>			</a:t>
             </a:r>
-            <a:endParaRPr lang="en-GB" sz="1600" dirty="0" smtClean="0"/>
           </a:p>
           <a:p>
             <a:pPr marL="0" indent="0">
@@ -6523,7 +6963,6 @@
               <a:rPr lang="en-GB" dirty="0"/>
               <a:t>for the 'Prize' column to check for outliers</a:t>
             </a:r>
-            <a:endParaRPr lang="en-GB" dirty="0"/>
           </a:p>
         </p:txBody>
       </p:sp>
@@ -6644,7 +7083,6 @@
               <a:rPr lang="en-GB" dirty="0"/>
               <a:t>Some More Data Exploration By Visualization</a:t>
             </a:r>
-            <a:endParaRPr lang="en-GB" dirty="0"/>
           </a:p>
         </p:txBody>
       </p:sp>

</xml_diff>